<commit_message>
Change color on Figure 1 (red instead of green)
</commit_message>
<xml_diff>
--- a/plots/predictions_comparisons_slopes.pptx
+++ b/plots/predictions_comparisons_slopes.pptx
@@ -259,7 +259,7 @@
           <a:p>
             <a:fld id="{CD874F49-FEBB-FF42-B278-30C4F47372F7}" type="datetimeFigureOut">
               <a:rPr lang="de-DE" smtClean="0"/>
-              <a:t>26.05.25</a:t>
+              <a:t>19.08.25</a:t>
             </a:fld>
             <a:endParaRPr lang="de-DE"/>
           </a:p>
@@ -457,7 +457,7 @@
           <a:p>
             <a:fld id="{CD874F49-FEBB-FF42-B278-30C4F47372F7}" type="datetimeFigureOut">
               <a:rPr lang="de-DE" smtClean="0"/>
-              <a:t>26.05.25</a:t>
+              <a:t>19.08.25</a:t>
             </a:fld>
             <a:endParaRPr lang="de-DE"/>
           </a:p>
@@ -665,7 +665,7 @@
           <a:p>
             <a:fld id="{CD874F49-FEBB-FF42-B278-30C4F47372F7}" type="datetimeFigureOut">
               <a:rPr lang="de-DE" smtClean="0"/>
-              <a:t>26.05.25</a:t>
+              <a:t>19.08.25</a:t>
             </a:fld>
             <a:endParaRPr lang="de-DE"/>
           </a:p>
@@ -863,7 +863,7 @@
           <a:p>
             <a:fld id="{CD874F49-FEBB-FF42-B278-30C4F47372F7}" type="datetimeFigureOut">
               <a:rPr lang="de-DE" smtClean="0"/>
-              <a:t>26.05.25</a:t>
+              <a:t>19.08.25</a:t>
             </a:fld>
             <a:endParaRPr lang="de-DE"/>
           </a:p>
@@ -1138,7 +1138,7 @@
           <a:p>
             <a:fld id="{CD874F49-FEBB-FF42-B278-30C4F47372F7}" type="datetimeFigureOut">
               <a:rPr lang="de-DE" smtClean="0"/>
-              <a:t>26.05.25</a:t>
+              <a:t>19.08.25</a:t>
             </a:fld>
             <a:endParaRPr lang="de-DE"/>
           </a:p>
@@ -1403,7 +1403,7 @@
           <a:p>
             <a:fld id="{CD874F49-FEBB-FF42-B278-30C4F47372F7}" type="datetimeFigureOut">
               <a:rPr lang="de-DE" smtClean="0"/>
-              <a:t>26.05.25</a:t>
+              <a:t>19.08.25</a:t>
             </a:fld>
             <a:endParaRPr lang="de-DE"/>
           </a:p>
@@ -1815,7 +1815,7 @@
           <a:p>
             <a:fld id="{CD874F49-FEBB-FF42-B278-30C4F47372F7}" type="datetimeFigureOut">
               <a:rPr lang="de-DE" smtClean="0"/>
-              <a:t>26.05.25</a:t>
+              <a:t>19.08.25</a:t>
             </a:fld>
             <a:endParaRPr lang="de-DE"/>
           </a:p>
@@ -1956,7 +1956,7 @@
           <a:p>
             <a:fld id="{CD874F49-FEBB-FF42-B278-30C4F47372F7}" type="datetimeFigureOut">
               <a:rPr lang="de-DE" smtClean="0"/>
-              <a:t>26.05.25</a:t>
+              <a:t>19.08.25</a:t>
             </a:fld>
             <a:endParaRPr lang="de-DE"/>
           </a:p>
@@ -2069,7 +2069,7 @@
           <a:p>
             <a:fld id="{CD874F49-FEBB-FF42-B278-30C4F47372F7}" type="datetimeFigureOut">
               <a:rPr lang="de-DE" smtClean="0"/>
-              <a:t>26.05.25</a:t>
+              <a:t>19.08.25</a:t>
             </a:fld>
             <a:endParaRPr lang="de-DE"/>
           </a:p>
@@ -2380,7 +2380,7 @@
           <a:p>
             <a:fld id="{CD874F49-FEBB-FF42-B278-30C4F47372F7}" type="datetimeFigureOut">
               <a:rPr lang="de-DE" smtClean="0"/>
-              <a:t>26.05.25</a:t>
+              <a:t>19.08.25</a:t>
             </a:fld>
             <a:endParaRPr lang="de-DE"/>
           </a:p>
@@ -2668,7 +2668,7 @@
           <a:p>
             <a:fld id="{CD874F49-FEBB-FF42-B278-30C4F47372F7}" type="datetimeFigureOut">
               <a:rPr lang="de-DE" smtClean="0"/>
-              <a:t>26.05.25</a:t>
+              <a:t>19.08.25</a:t>
             </a:fld>
             <a:endParaRPr lang="de-DE"/>
           </a:p>
@@ -2909,7 +2909,7 @@
           <a:p>
             <a:fld id="{CD874F49-FEBB-FF42-B278-30C4F47372F7}" type="datetimeFigureOut">
               <a:rPr lang="de-DE" smtClean="0"/>
-              <a:t>26.05.25</a:t>
+              <a:t>19.08.25</a:t>
             </a:fld>
             <a:endParaRPr lang="de-DE"/>
           </a:p>
@@ -3348,7 +3348,7 @@
         <p:spPr>
           <a:xfrm>
             <a:off x="697523" y="712177"/>
-            <a:ext cx="5641730" cy="4231297"/>
+            <a:ext cx="5641729" cy="4231297"/>
           </a:xfrm>
           <a:prstGeom prst="rect">
             <a:avLst/>
@@ -3472,7 +3472,7 @@
             <a:r>
               <a:rPr lang="de-DE" sz="1400" dirty="0" err="1">
                 <a:solidFill>
-                  <a:srgbClr val="009E73"/>
+                  <a:srgbClr val="D25C00"/>
                 </a:solidFill>
                 <a:latin typeface="Consolas" panose="020B0609020204030204" pitchFamily="49" charset="0"/>
                 <a:cs typeface="Consolas" panose="020B0609020204030204" pitchFamily="49" charset="0"/>
@@ -3481,7 +3481,7 @@
             </a:r>
             <a:endParaRPr lang="de-DE" sz="1400" dirty="0">
               <a:solidFill>
-                <a:srgbClr val="009E73"/>
+                <a:srgbClr val="D25C00"/>
               </a:solidFill>
               <a:latin typeface="Consolas" panose="020B0609020204030204" pitchFamily="49" charset="0"/>
               <a:cs typeface="Consolas" panose="020B0609020204030204" pitchFamily="49" charset="0"/>

</xml_diff>